<commit_message>
Committing yesterdays poster changes.
git-svn-id: https://svn.ece.auckland.ac.nz/svn/p4p-2010-g79@55 a75856b6-468a-0410-9532-ba8c368bb4fd
</commit_message>
<xml_diff>
--- a/docs/P4P poster.pptx
+++ b/docs/P4P poster.pptx
@@ -3096,16 +3096,40 @@
             <a:ext cx="22491773" cy="3118930"/>
           </a:xfrm>
           <a:effectLst/>
+          <a:scene3d>
+            <a:camera prst="orthographicFront"/>
+            <a:lightRig rig="threePt" dir="t"/>
+          </a:scene3d>
+          <a:sp3d>
+            <a:bevelT/>
+          </a:sp3d>
         </p:spPr>
         <p:txBody>
           <a:bodyPr>
             <a:normAutofit fontScale="90000"/>
+            <a:sp3d extrusionH="57150">
+              <a:bevelT w="38100" h="38100"/>
+            </a:sp3d>
           </a:bodyPr>
           <a:lstStyle/>
           <a:p>
             <a:r>
               <a:rPr lang="en-NZ" dirty="0" smtClean="0">
+                <a:ln w="76200">
+                  <a:noFill/>
+                </a:ln>
+                <a:solidFill>
+                  <a:schemeClr val="bg2">
+                    <a:lumMod val="50000"/>
+                  </a:schemeClr>
+                </a:solidFill>
                 <a:effectLst>
+                  <a:glow rad="139700">
+                    <a:schemeClr val="accent3">
+                      <a:lumMod val="50000"/>
+                      <a:alpha val="40000"/>
+                    </a:schemeClr>
+                  </a:glow>
                   <a:outerShdw blurRad="38100" dist="38100" dir="2700000" algn="tl">
                     <a:srgbClr val="000000">
                       <a:alpha val="43137"/>
@@ -3117,6 +3141,27 @@
               <a:t>ALGORITHM VISUALISATION</a:t>
             </a:r>
             <a:endParaRPr lang="en-NZ" dirty="0">
+              <a:ln w="76200">
+                <a:noFill/>
+              </a:ln>
+              <a:solidFill>
+                <a:schemeClr val="bg2">
+                  <a:lumMod val="50000"/>
+                </a:schemeClr>
+              </a:solidFill>
+              <a:effectLst>
+                <a:glow rad="139700">
+                  <a:schemeClr val="accent3">
+                    <a:lumMod val="50000"/>
+                    <a:alpha val="40000"/>
+                  </a:schemeClr>
+                </a:glow>
+                <a:outerShdw blurRad="38100" dist="38100" dir="2700000" algn="tl">
+                  <a:srgbClr val="000000">
+                    <a:alpha val="43137"/>
+                  </a:srgbClr>
+                </a:outerShdw>
+              </a:effectLst>
               <a:latin typeface="Franklin Gothic Heavy" pitchFamily="34" charset="0"/>
             </a:endParaRPr>
           </a:p>
@@ -3152,32 +3197,6 @@
           </a:p>
         </p:txBody>
       </p:sp>
-      <p:pic>
-        <p:nvPicPr>
-          <p:cNvPr id="1028" name="Picture 4" descr="C:\Users\Nathan\Desktop\poster\FOE_Logo.png"/>
-          <p:cNvPicPr>
-            <a:picLocks noChangeAspect="1" noChangeArrowheads="1"/>
-          </p:cNvPicPr>
-          <p:nvPr/>
-        </p:nvPicPr>
-        <p:blipFill>
-          <a:blip r:embed="rId3" cstate="print"/>
-          <a:srcRect/>
-          <a:stretch>
-            <a:fillRect/>
-          </a:stretch>
-        </p:blipFill>
-        <p:spPr bwMode="auto">
-          <a:xfrm>
-            <a:off x="23348899" y="19406368"/>
-            <a:ext cx="5274892" cy="1345380"/>
-          </a:xfrm>
-          <a:prstGeom prst="rect">
-            <a:avLst/>
-          </a:prstGeom>
-          <a:noFill/>
-        </p:spPr>
-      </p:pic>
       <p:sp>
         <p:nvSpPr>
           <p:cNvPr id="17" name="Title 1"/>
@@ -3220,12 +3239,15 @@
               <a:defRPr/>
             </a:pPr>
             <a:r>
-              <a:rPr kumimoji="0" lang="en-NZ" sz="4400" b="0" i="0" u="none" strike="noStrike" kern="1200" cap="none" spc="0" normalizeH="0" baseline="0" noProof="0" dirty="0" smtClean="0">
+              <a:rPr kumimoji="0" lang="en-NZ" sz="4400" b="1" i="0" u="none" strike="noStrike" kern="1200" cap="none" spc="0" normalizeH="0" baseline="0" noProof="0" dirty="0" smtClean="0">
                 <a:ln>
                   <a:noFill/>
                 </a:ln>
                 <a:solidFill>
-                  <a:schemeClr val="tx1"/>
+                  <a:schemeClr val="accent3">
+                    <a:lumMod val="20000"/>
+                    <a:lumOff val="80000"/>
+                  </a:schemeClr>
                 </a:solidFill>
                 <a:effectLst>
                   <a:outerShdw blurRad="38100" dist="38100" dir="2700000" algn="tl">
@@ -3243,12 +3265,15 @@
               <a:t>Group 79: David</a:t>
             </a:r>
             <a:r>
-              <a:rPr kumimoji="0" lang="en-NZ" sz="4400" b="0" i="0" u="none" strike="noStrike" kern="1200" cap="none" spc="0" normalizeH="0" noProof="0" dirty="0" smtClean="0">
+              <a:rPr kumimoji="0" lang="en-NZ" sz="4400" b="1" i="0" u="none" strike="noStrike" kern="1200" cap="none" spc="0" normalizeH="0" noProof="0" dirty="0" smtClean="0">
                 <a:ln>
                   <a:noFill/>
                 </a:ln>
                 <a:solidFill>
-                  <a:schemeClr val="tx1"/>
+                  <a:schemeClr val="accent3">
+                    <a:lumMod val="20000"/>
+                    <a:lumOff val="80000"/>
+                  </a:schemeClr>
                 </a:solidFill>
                 <a:effectLst>
                   <a:outerShdw blurRad="38100" dist="38100" dir="2700000" algn="tl">
@@ -3285,7 +3310,13 @@
               <a:defRPr/>
             </a:pPr>
             <a:r>
-              <a:rPr lang="en-NZ" sz="4400" baseline="0" dirty="0" smtClean="0">
+              <a:rPr lang="en-NZ" sz="4400" b="1" baseline="0" dirty="0" smtClean="0">
+                <a:solidFill>
+                  <a:schemeClr val="accent3">
+                    <a:lumMod val="20000"/>
+                    <a:lumOff val="80000"/>
+                  </a:schemeClr>
+                </a:solidFill>
                 <a:effectLst>
                   <a:outerShdw blurRad="38100" dist="38100" dir="2700000" algn="tl">
                     <a:srgbClr val="000000">
@@ -3300,7 +3331,13 @@
               <a:t>Supervisor: Michael </a:t>
             </a:r>
             <a:r>
-              <a:rPr lang="en-NZ" sz="4400" baseline="0" dirty="0" err="1" smtClean="0">
+              <a:rPr lang="en-NZ" sz="4400" b="1" baseline="0" dirty="0" err="1" smtClean="0">
+                <a:solidFill>
+                  <a:schemeClr val="accent3">
+                    <a:lumMod val="20000"/>
+                    <a:lumOff val="80000"/>
+                  </a:schemeClr>
+                </a:solidFill>
                 <a:effectLst>
                   <a:outerShdw blurRad="38100" dist="38100" dir="2700000" algn="tl">
                     <a:srgbClr val="000000">
@@ -3314,12 +3351,15 @@
               </a:rPr>
               <a:t>Dinneen</a:t>
             </a:r>
-            <a:endParaRPr kumimoji="0" lang="en-NZ" sz="4400" b="0" i="0" u="none" strike="noStrike" kern="1200" cap="none" spc="0" normalizeH="0" baseline="0" noProof="0" dirty="0">
+            <a:endParaRPr kumimoji="0" lang="en-NZ" sz="4400" b="1" i="0" u="none" strike="noStrike" kern="1200" cap="none" spc="0" normalizeH="0" baseline="0" noProof="0" dirty="0">
               <a:ln>
                 <a:noFill/>
               </a:ln>
               <a:solidFill>
-                <a:schemeClr val="tx1"/>
+                <a:schemeClr val="accent3">
+                  <a:lumMod val="20000"/>
+                  <a:lumOff val="80000"/>
+                </a:schemeClr>
               </a:solidFill>
               <a:effectLst/>
               <a:uLnTx/>
@@ -3346,7 +3386,7 @@
             <a:avLst/>
           </a:prstGeom>
           <a:solidFill>
-            <a:schemeClr val="tx2">
+            <a:schemeClr val="accent3">
               <a:lumMod val="40000"/>
               <a:lumOff val="60000"/>
             </a:schemeClr>
@@ -3425,20 +3465,9 @@
                 <a:solidFill>
                   <a:prstClr val="black"/>
                 </a:solidFill>
-                <a:latin typeface="Times New Roman" pitchFamily="18" charset="0"/>
                 <a:cs typeface="Times New Roman" pitchFamily="18" charset="0"/>
               </a:rPr>
-              <a:t>We have developed a generic framework for algorithm visualisation which can be used effectively in computer science education. Possible future work </a:t>
-            </a:r>
-            <a:r>
-              <a:rPr lang="en-NZ" sz="2200" smtClean="0">
-                <a:solidFill>
-                  <a:prstClr val="black"/>
-                </a:solidFill>
-                <a:latin typeface="Times New Roman" pitchFamily="18" charset="0"/>
-                <a:cs typeface="Times New Roman" pitchFamily="18" charset="0"/>
-              </a:rPr>
-              <a:t>includes:</a:t>
+              <a:t>We have developed a generic framework for algorithm visualisation which can be used effectively in computer science education. Possible future work includes:</a:t>
             </a:r>
           </a:p>
           <a:p>
@@ -3451,7 +3480,6 @@
               <a:solidFill>
                 <a:prstClr val="black"/>
               </a:solidFill>
-              <a:latin typeface="Times New Roman" pitchFamily="18" charset="0"/>
               <a:cs typeface="Times New Roman" pitchFamily="18" charset="0"/>
             </a:endParaRPr>
           </a:p>
@@ -3468,7 +3496,6 @@
                 <a:solidFill>
                   <a:prstClr val="black"/>
                 </a:solidFill>
-                <a:latin typeface="Times New Roman" pitchFamily="18" charset="0"/>
                 <a:cs typeface="Times New Roman" pitchFamily="18" charset="0"/>
               </a:rPr>
               <a:t> Adding more wrappers and viewable equivalents so that more data structures can be visualised; e.g. graph data structures and matrices.</a:t>
@@ -3487,7 +3514,6 @@
                 <a:solidFill>
                   <a:prstClr val="black"/>
                 </a:solidFill>
-                <a:latin typeface="Times New Roman" pitchFamily="18" charset="0"/>
                 <a:cs typeface="Times New Roman" pitchFamily="18" charset="0"/>
               </a:rPr>
               <a:t> Building upon the use-case of this framework as a visual debugger. This would involve writing a data-source component in another language which is more amenable to introspection.</a:t>
@@ -3506,7 +3532,6 @@
                 <a:solidFill>
                   <a:prstClr val="black"/>
                 </a:solidFill>
-                <a:latin typeface="Times New Roman" pitchFamily="18" charset="0"/>
                 <a:cs typeface="Times New Roman" pitchFamily="18" charset="0"/>
               </a:rPr>
               <a:t> Allowing algorithm animations to be saved in a video format for archiving and future use.</a:t>
@@ -3525,7 +3550,6 @@
                 <a:solidFill>
                   <a:prstClr val="black"/>
                 </a:solidFill>
-                <a:latin typeface="Times New Roman" pitchFamily="18" charset="0"/>
                 <a:cs typeface="Times New Roman" pitchFamily="18" charset="0"/>
               </a:rPr>
               <a:t> Adding a statistics module which displays useful data about the operations performed on various data structures.</a:t>
@@ -3549,7 +3573,7 @@
             <a:avLst/>
           </a:prstGeom>
           <a:solidFill>
-            <a:schemeClr val="tx2">
+            <a:schemeClr val="accent3">
               <a:lumMod val="40000"/>
               <a:lumOff val="60000"/>
             </a:schemeClr>
@@ -3608,7 +3632,7 @@
           </a:p>
           <a:p>
             <a:pPr lvl="0"/>
-            <a:endParaRPr lang="en-NZ" sz="2200" dirty="0" smtClean="0">
+            <a:endParaRPr lang="en-NZ" sz="2600" dirty="0" smtClean="0">
               <a:solidFill>
                 <a:prstClr val="black"/>
               </a:solidFill>
@@ -3627,8 +3651,9 @@
                 <a:solidFill>
                   <a:prstClr val="black"/>
                 </a:solidFill>
-                <a:latin typeface="Times New Roman" pitchFamily="18" charset="0"/>
-                <a:cs typeface="Times New Roman" pitchFamily="18" charset="0"/>
+                <a:latin typeface="Cambria" pitchFamily="18" charset="0"/>
+                <a:ea typeface="Tahoma" pitchFamily="34" charset="0"/>
+                <a:cs typeface="Tahoma" pitchFamily="34" charset="0"/>
               </a:rPr>
               <a:t>To develop a tool for automatically animating algorithms in action, focussing on:</a:t>
             </a:r>
@@ -3643,8 +3668,9 @@
               <a:solidFill>
                 <a:prstClr val="black"/>
               </a:solidFill>
-              <a:latin typeface="Times New Roman" pitchFamily="18" charset="0"/>
-              <a:cs typeface="Times New Roman" pitchFamily="18" charset="0"/>
+              <a:latin typeface="Cambria" pitchFamily="18" charset="0"/>
+              <a:ea typeface="Tahoma" pitchFamily="34" charset="0"/>
+              <a:cs typeface="Tahoma" pitchFamily="34" charset="0"/>
             </a:endParaRPr>
           </a:p>
           <a:p>
@@ -3660,8 +3686,9 @@
                 <a:solidFill>
                   <a:prstClr val="black"/>
                 </a:solidFill>
-                <a:latin typeface="Times New Roman" pitchFamily="18" charset="0"/>
-                <a:cs typeface="Times New Roman" pitchFamily="18" charset="0"/>
+                <a:latin typeface="Cambria" pitchFamily="18" charset="0"/>
+                <a:ea typeface="Tahoma" pitchFamily="34" charset="0"/>
+                <a:cs typeface="Tahoma" pitchFamily="34" charset="0"/>
               </a:rPr>
               <a:t> Ease of use – animations should be highly comprehensible for students and highly configurable by lecturers. </a:t>
             </a:r>
@@ -3679,12 +3706,17 @@
                 <a:solidFill>
                   <a:prstClr val="black"/>
                 </a:solidFill>
-                <a:latin typeface="Times New Roman" pitchFamily="18" charset="0"/>
-                <a:cs typeface="Times New Roman" pitchFamily="18" charset="0"/>
+                <a:latin typeface="Cambria" pitchFamily="18" charset="0"/>
+                <a:ea typeface="Tahoma" pitchFamily="34" charset="0"/>
+                <a:cs typeface="Tahoma" pitchFamily="34" charset="0"/>
               </a:rPr>
               <a:t>Versatility – our framework should not be biased towards any family of algorithms.</a:t>
             </a:r>
-            <a:endParaRPr lang="en-NZ" dirty="0"/>
+            <a:endParaRPr lang="en-NZ" sz="2200" dirty="0">
+              <a:latin typeface="Cambria" pitchFamily="18" charset="0"/>
+              <a:ea typeface="Tahoma" pitchFamily="34" charset="0"/>
+              <a:cs typeface="Tahoma" pitchFamily="34" charset="0"/>
+            </a:endParaRPr>
           </a:p>
         </p:txBody>
       </p:sp>
@@ -3697,13 +3729,13 @@
         <p:spPr>
           <a:xfrm>
             <a:off x="7867179" y="16094000"/>
-            <a:ext cx="13897544" cy="4752528"/>
+            <a:ext cx="13897544" cy="4968552"/>
           </a:xfrm>
           <a:prstGeom prst="roundRect">
             <a:avLst/>
           </a:prstGeom>
           <a:solidFill>
-            <a:schemeClr val="tx2">
+            <a:schemeClr val="accent3">
               <a:lumMod val="40000"/>
               <a:lumOff val="60000"/>
             </a:schemeClr>
@@ -3774,7 +3806,7 @@
                 <a:solidFill>
                   <a:prstClr val="black"/>
                 </a:solidFill>
-                <a:latin typeface="Times New Roman" pitchFamily="18" charset="0"/>
+                <a:latin typeface="Cambria" pitchFamily="18" charset="0"/>
                 <a:cs typeface="Times New Roman" pitchFamily="18" charset="0"/>
               </a:rPr>
               <a:t>Developing a framework which works out of the box. In order for a user to have their algorithm visualised, they need simply write it as normal in C++ , include our header file and link against our library. </a:t>
@@ -3793,7 +3825,7 @@
                 <a:solidFill>
                   <a:prstClr val="black"/>
                 </a:solidFill>
-                <a:latin typeface="Times New Roman" pitchFamily="18" charset="0"/>
+                <a:latin typeface="Cambria" pitchFamily="18" charset="0"/>
                 <a:cs typeface="Times New Roman" pitchFamily="18" charset="0"/>
               </a:rPr>
               <a:t>Automatically detecting all instantiated data structures and deciding which ones should be displayed. </a:t>
@@ -3812,7 +3844,7 @@
                 <a:solidFill>
                   <a:prstClr val="black"/>
                 </a:solidFill>
-                <a:latin typeface="Times New Roman" pitchFamily="18" charset="0"/>
+                <a:latin typeface="Cambria" pitchFamily="18" charset="0"/>
                 <a:cs typeface="Times New Roman" pitchFamily="18" charset="0"/>
               </a:rPr>
               <a:t>Allowing the user to manipulate and drag these viewable objects around on screen.</a:t>
@@ -3831,7 +3863,7 @@
                 <a:solidFill>
                   <a:prstClr val="black"/>
                 </a:solidFill>
-                <a:latin typeface="Times New Roman" pitchFamily="18" charset="0"/>
+                <a:latin typeface="Cambria" pitchFamily="18" charset="0"/>
                 <a:cs typeface="Times New Roman" pitchFamily="18" charset="0"/>
               </a:rPr>
               <a:t>Tracking the movement of data throughout data structures ranging from integer types to hash tables. This allows our code to analyse complex data dependencies over time and compress them into useful and relevant actions.</a:t>
@@ -3850,12 +3882,14 @@
                 <a:solidFill>
                   <a:prstClr val="black"/>
                 </a:solidFill>
-                <a:latin typeface="Times New Roman" pitchFamily="18" charset="0"/>
+                <a:latin typeface="Cambria" pitchFamily="18" charset="0"/>
                 <a:cs typeface="Times New Roman" pitchFamily="18" charset="0"/>
               </a:rPr>
               <a:t>Providing functions which allow the user (in code) to perform useful tasks such as enforcing the display or suppression of specific data structures, or giving the View hints as to how it should lay out viewable objects according to the problem at hand.</a:t>
             </a:r>
-            <a:endParaRPr lang="en-NZ" dirty="0"/>
+            <a:endParaRPr lang="en-NZ" dirty="0">
+              <a:latin typeface="Cambria" pitchFamily="18" charset="0"/>
+            </a:endParaRPr>
           </a:p>
         </p:txBody>
       </p:sp>
@@ -3876,7 +3910,7 @@
             </a:avLst>
           </a:prstGeom>
           <a:solidFill>
-            <a:schemeClr val="tx2">
+            <a:schemeClr val="accent3">
               <a:lumMod val="40000"/>
               <a:lumOff val="60000"/>
             </a:schemeClr>
@@ -3951,7 +3985,7 @@
             <a:avLst/>
           </a:prstGeom>
           <a:solidFill>
-            <a:schemeClr val="tx2">
+            <a:schemeClr val="accent3">
               <a:lumMod val="40000"/>
               <a:lumOff val="60000"/>
             </a:schemeClr>
@@ -4032,7 +4066,6 @@
                 <a:solidFill>
                   <a:prstClr val="black"/>
                 </a:solidFill>
-                <a:latin typeface="Times New Roman" pitchFamily="18" charset="0"/>
                 <a:cs typeface="Times New Roman" pitchFamily="18" charset="0"/>
               </a:rPr>
               <a:t> Presenting the data structures in a space-efficient layout which is useful over a range of algorithms</a:t>
@@ -4051,7 +4084,6 @@
                 <a:solidFill>
                   <a:prstClr val="black"/>
                 </a:solidFill>
-                <a:latin typeface="Times New Roman" pitchFamily="18" charset="0"/>
                 <a:cs typeface="Times New Roman" pitchFamily="18" charset="0"/>
               </a:rPr>
               <a:t> Performing introspection of data structures without affecting  the expected operation of the original code or included libraries. </a:t>
@@ -4070,7 +4102,6 @@
                 <a:solidFill>
                   <a:prstClr val="black"/>
                 </a:solidFill>
-                <a:latin typeface="Times New Roman" pitchFamily="18" charset="0"/>
                 <a:cs typeface="Times New Roman" pitchFamily="18" charset="0"/>
               </a:rPr>
               <a:t> Reading ahead through user code instructions and identifying sequences which constitute a single logical action.</a:t>
@@ -4094,7 +4125,7 @@
             <a:avLst/>
           </a:prstGeom>
           <a:solidFill>
-            <a:schemeClr val="tx2">
+            <a:schemeClr val="accent3">
               <a:lumMod val="40000"/>
               <a:lumOff val="60000"/>
             </a:schemeClr>
@@ -4194,7 +4225,7 @@
                     <a:lumOff val="5000"/>
                   </a:schemeClr>
                 </a:solidFill>
-                <a:latin typeface="Times New Roman" pitchFamily="18" charset="0"/>
+                <a:latin typeface="Cambria" pitchFamily="18" charset="0"/>
                 <a:cs typeface="Times New Roman" pitchFamily="18" charset="0"/>
               </a:rPr>
               <a:t>Typically, lecturers will use some sort of diagram to show an example of an algorithm in action. This might just be a quick sketch, an animation, or even an interactive program.</a:t>
@@ -4213,7 +4244,7 @@
                   <a:lumOff val="5000"/>
                 </a:schemeClr>
               </a:solidFill>
-              <a:latin typeface="Times New Roman" pitchFamily="18" charset="0"/>
+              <a:latin typeface="Cambria" pitchFamily="18" charset="0"/>
               <a:cs typeface="Times New Roman" pitchFamily="18" charset="0"/>
             </a:endParaRPr>
           </a:p>
@@ -4231,7 +4262,7 @@
                     <a:lumOff val="5000"/>
                   </a:schemeClr>
                 </a:solidFill>
-                <a:latin typeface="Times New Roman" pitchFamily="18" charset="0"/>
+                <a:latin typeface="Cambria" pitchFamily="18" charset="0"/>
                 <a:cs typeface="Times New Roman" pitchFamily="18" charset="0"/>
               </a:rPr>
               <a:t>There are existing databases of animated GIFs and Java applets which are tailored only towards specific algorithms. Furthermore, because they are developed independently using different tools/languages, there is much repeated work between them.</a:t>
@@ -4250,7 +4281,7 @@
                   <a:lumOff val="5000"/>
                 </a:schemeClr>
               </a:solidFill>
-              <a:latin typeface="Times New Roman" pitchFamily="18" charset="0"/>
+              <a:latin typeface="Cambria" pitchFamily="18" charset="0"/>
               <a:cs typeface="Times New Roman" pitchFamily="18" charset="0"/>
             </a:endParaRPr>
           </a:p>
@@ -4268,7 +4299,7 @@
                     <a:lumOff val="5000"/>
                   </a:schemeClr>
                 </a:solidFill>
-                <a:latin typeface="Times New Roman" pitchFamily="18" charset="0"/>
+                <a:latin typeface="Cambria" pitchFamily="18" charset="0"/>
                 <a:cs typeface="Times New Roman" pitchFamily="18" charset="0"/>
               </a:rPr>
               <a:t>The converse approach taken by debuggers is to display as much of the program state as possible at discrete points in time. This is problematic, as not only does it not emphasize the data which is crucial to comprehending the algorithm at hand, it fails to provide the transitions between program states which animations depict so well.</a:t>
@@ -4360,7 +4391,10 @@
             <a:avLst/>
           </a:prstGeom>
           <a:solidFill>
-            <a:schemeClr val="bg1"/>
+            <a:schemeClr val="accent3">
+              <a:lumMod val="20000"/>
+              <a:lumOff val="80000"/>
+            </a:schemeClr>
           </a:solidFill>
           <a:ln>
             <a:solidFill>
@@ -5452,7 +5486,7 @@
             <a:avLst/>
           </a:prstGeom>
           <a:solidFill>
-            <a:srgbClr val="FCFF81"/>
+            <a:srgbClr val="CDCEB6"/>
           </a:solidFill>
         </p:spPr>
         <p:style>
@@ -5648,7 +5682,10 @@
             <a:avLst/>
           </a:prstGeom>
           <a:solidFill>
-            <a:schemeClr val="bg1"/>
+            <a:schemeClr val="accent3">
+              <a:lumMod val="20000"/>
+              <a:lumOff val="80000"/>
+            </a:schemeClr>
           </a:solidFill>
           <a:ln>
             <a:solidFill>
@@ -6628,7 +6665,7 @@
         </p:nvSpPr>
         <p:spPr>
           <a:xfrm>
-            <a:off x="18380347" y="8533160"/>
+            <a:off x="18308339" y="8533160"/>
             <a:ext cx="648072" cy="576064"/>
           </a:xfrm>
           <a:prstGeom prst="rect">
@@ -6752,7 +6789,7 @@
         </p:nvCxnSpPr>
         <p:spPr>
           <a:xfrm>
-            <a:off x="17156211" y="8821192"/>
+            <a:off x="17084203" y="8821192"/>
             <a:ext cx="1224136" cy="1588"/>
           </a:xfrm>
           <a:prstGeom prst="straightConnector1">
@@ -7034,8 +7071,8 @@
         </p:nvSpPr>
         <p:spPr>
           <a:xfrm>
-            <a:off x="8731275" y="10333360"/>
-            <a:ext cx="12241360" cy="430887"/>
+            <a:off x="8443243" y="10333360"/>
+            <a:ext cx="13033448" cy="430887"/>
           </a:xfrm>
           <a:prstGeom prst="rect">
             <a:avLst/>
@@ -7050,13 +7087,13 @@
           <a:p>
             <a:r>
               <a:rPr lang="en-NZ" sz="2200" dirty="0" smtClean="0">
-                <a:latin typeface="Times New Roman" pitchFamily="18" charset="0"/>
+                <a:latin typeface="Cambria" pitchFamily="18" charset="0"/>
                 <a:cs typeface="Times New Roman" pitchFamily="18" charset="0"/>
               </a:rPr>
               <a:t>The C++ Data Source intercepts changes to a data structure and causes animations to be played in the view.</a:t>
             </a:r>
             <a:endParaRPr lang="en-NZ" sz="2200" dirty="0">
-              <a:latin typeface="Times New Roman" pitchFamily="18" charset="0"/>
+              <a:latin typeface="Cambria" pitchFamily="18" charset="0"/>
               <a:cs typeface="Times New Roman" pitchFamily="18" charset="0"/>
             </a:endParaRPr>
           </a:p>
@@ -7070,8 +7107,8 @@
         </p:nvSpPr>
         <p:spPr>
           <a:xfrm>
-            <a:off x="8947299" y="14437816"/>
-            <a:ext cx="12241360" cy="1107996"/>
+            <a:off x="8731275" y="14437816"/>
+            <a:ext cx="12457384" cy="1107996"/>
           </a:xfrm>
           <a:prstGeom prst="rect">
             <a:avLst/>
@@ -7086,13 +7123,13 @@
           <a:p>
             <a:r>
               <a:rPr lang="en-NZ" sz="2200" dirty="0" smtClean="0">
-                <a:latin typeface="Times New Roman" pitchFamily="18" charset="0"/>
+                <a:latin typeface="Cambria" pitchFamily="18" charset="0"/>
                 <a:cs typeface="Times New Roman" pitchFamily="18" charset="0"/>
               </a:rPr>
               <a:t>User code instructions are converted into higher level actions and clustered together to form visually meaningful animations. In this case, three code instructions are converted into two actions which are treated as one swap animation.</a:t>
             </a:r>
             <a:endParaRPr lang="en-NZ" sz="2200" dirty="0">
-              <a:latin typeface="Times New Roman" pitchFamily="18" charset="0"/>
+              <a:latin typeface="Cambria" pitchFamily="18" charset="0"/>
               <a:cs typeface="Times New Roman" pitchFamily="18" charset="0"/>
             </a:endParaRPr>
           </a:p>
@@ -7157,19 +7194,45 @@
           <p:nvPr/>
         </p:nvPicPr>
         <p:blipFill>
-          <a:blip r:embed="rId4" cstate="print"/>
+          <a:blip r:embed="rId3" cstate="print"/>
           <a:stretch>
             <a:fillRect/>
           </a:stretch>
         </p:blipFill>
         <p:spPr>
           <a:xfrm>
-            <a:off x="1962523" y="19262352"/>
+            <a:off x="1890515" y="19334360"/>
             <a:ext cx="3888432" cy="1360951"/>
           </a:xfrm>
           <a:prstGeom prst="rect">
             <a:avLst/>
           </a:prstGeom>
+        </p:spPr>
+      </p:pic>
+      <p:pic>
+        <p:nvPicPr>
+          <p:cNvPr id="48" name="Picture 2" descr="F:\fourth year rape\SOFTENG401\UOA_Logo_RGB_Hor.jpg"/>
+          <p:cNvPicPr>
+            <a:picLocks noChangeAspect="1" noChangeArrowheads="1"/>
+          </p:cNvPicPr>
+          <p:nvPr/>
+        </p:nvPicPr>
+        <p:blipFill>
+          <a:blip r:embed="rId4" cstate="print"/>
+          <a:srcRect/>
+          <a:stretch>
+            <a:fillRect/>
+          </a:stretch>
+        </p:blipFill>
+        <p:spPr bwMode="auto">
+          <a:xfrm>
+            <a:off x="23780947" y="19118336"/>
+            <a:ext cx="4812848" cy="1825055"/>
+          </a:xfrm>
+          <a:prstGeom prst="rect">
+            <a:avLst/>
+          </a:prstGeom>
+          <a:noFill/>
         </p:spPr>
       </p:pic>
     </p:spTree>

</xml_diff>